<commit_message>
JS Objects Lesson Fixes
</commit_message>
<xml_diff>
--- a/JavaScriptObjects/JavaScriptArrays.pptx
+++ b/JavaScriptObjects/JavaScriptArrays.pptx
@@ -212,7 +212,7 @@
           <a:p>
             <a:fld id="{19104133-B5B0-4351-8158-4F0E5EB1E2BF}" type="datetimeFigureOut">
               <a:rPr lang="en-US" smtClean="0"/>
-              <a:t>1/10/2020</a:t>
+              <a:t>2/4/2020</a:t>
             </a:fld>
             <a:endParaRPr lang="en-US"/>
           </a:p>
@@ -1435,7 +1435,7 @@
             <a:fld id="{1C2D31DE-C454-491C-B5C3-F097855E3DF7}" type="datetime4">
               <a:rPr lang="en-US" smtClean="0"/>
               <a:pPr/>
-              <a:t>January 10, 2020</a:t>
+              <a:t>February 4, 2020</a:t>
             </a:fld>
             <a:endParaRPr lang="en-US" dirty="0"/>
           </a:p>
@@ -4835,7 +4835,7 @@
           <a:p>
             <a:fld id="{5958763E-B898-436D-883D-03711491D54A}" type="datetimeFigureOut">
               <a:rPr lang="en-US" smtClean="0"/>
-              <a:t>1/10/2020</a:t>
+              <a:t>2/4/2020</a:t>
             </a:fld>
             <a:endParaRPr lang="en-US"/>
           </a:p>
@@ -5036,7 +5036,7 @@
           <a:p>
             <a:fld id="{5958763E-B898-436D-883D-03711491D54A}" type="datetimeFigureOut">
               <a:rPr lang="en-US" smtClean="0"/>
-              <a:t>1/10/2020</a:t>
+              <a:t>2/4/2020</a:t>
             </a:fld>
             <a:endParaRPr lang="en-US"/>
           </a:p>
@@ -5293,7 +5293,7 @@
           <a:p>
             <a:fld id="{5958763E-B898-436D-883D-03711491D54A}" type="datetimeFigureOut">
               <a:rPr lang="en-US" smtClean="0"/>
-              <a:t>1/10/2020</a:t>
+              <a:t>2/4/2020</a:t>
             </a:fld>
             <a:endParaRPr lang="en-US"/>
           </a:p>
@@ -5648,7 +5648,7 @@
           <a:p>
             <a:fld id="{5958763E-B898-436D-883D-03711491D54A}" type="datetimeFigureOut">
               <a:rPr lang="en-US" smtClean="0"/>
-              <a:t>1/10/2020</a:t>
+              <a:t>2/4/2020</a:t>
             </a:fld>
             <a:endParaRPr lang="en-US"/>
           </a:p>
@@ -6071,7 +6071,7 @@
           <a:p>
             <a:fld id="{5958763E-B898-436D-883D-03711491D54A}" type="datetimeFigureOut">
               <a:rPr lang="en-US" smtClean="0"/>
-              <a:t>1/10/2020</a:t>
+              <a:t>2/4/2020</a:t>
             </a:fld>
             <a:endParaRPr lang="en-US"/>
           </a:p>
@@ -6579,7 +6579,7 @@
           <a:p>
             <a:fld id="{5958763E-B898-436D-883D-03711491D54A}" type="datetimeFigureOut">
               <a:rPr lang="en-US" smtClean="0"/>
-              <a:t>1/10/2020</a:t>
+              <a:t>2/4/2020</a:t>
             </a:fld>
             <a:endParaRPr lang="en-US"/>
           </a:p>
@@ -7037,7 +7037,7 @@
           <a:p>
             <a:fld id="{5958763E-B898-436D-883D-03711491D54A}" type="datetimeFigureOut">
               <a:rPr lang="en-US" smtClean="0"/>
-              <a:t>1/10/2020</a:t>
+              <a:t>2/4/2020</a:t>
             </a:fld>
             <a:endParaRPr lang="en-US"/>
           </a:p>
@@ -7655,7 +7655,7 @@
           <a:p>
             <a:fld id="{5958763E-B898-436D-883D-03711491D54A}" type="datetimeFigureOut">
               <a:rPr lang="en-US" smtClean="0"/>
-              <a:t>1/10/2020</a:t>
+              <a:t>2/4/2020</a:t>
             </a:fld>
             <a:endParaRPr lang="en-US"/>
           </a:p>
@@ -8433,7 +8433,7 @@
           <a:p>
             <a:fld id="{5958763E-B898-436D-883D-03711491D54A}" type="datetimeFigureOut">
               <a:rPr lang="en-US" smtClean="0"/>
-              <a:t>1/10/2020</a:t>
+              <a:t>2/4/2020</a:t>
             </a:fld>
             <a:endParaRPr lang="en-US"/>
           </a:p>
@@ -8544,7 +8544,7 @@
           <a:p>
             <a:fld id="{5958763E-B898-436D-883D-03711491D54A}" type="datetimeFigureOut">
               <a:rPr lang="en-US" smtClean="0"/>
-              <a:t>1/10/2020</a:t>
+              <a:t>2/4/2020</a:t>
             </a:fld>
             <a:endParaRPr lang="en-US"/>
           </a:p>
@@ -8886,7 +8886,7 @@
             <a:fld id="{1C2D31DE-C454-491C-B5C3-F097855E3DF7}" type="datetime4">
               <a:rPr lang="en-US" smtClean="0"/>
               <a:pPr/>
-              <a:t>January 10, 2020</a:t>
+              <a:t>February 4, 2020</a:t>
             </a:fld>
             <a:endParaRPr lang="en-US" dirty="0"/>
           </a:p>
@@ -12046,7 +12046,7 @@
           <a:p>
             <a:fld id="{5958763E-B898-436D-883D-03711491D54A}" type="datetimeFigureOut">
               <a:rPr lang="en-US" smtClean="0"/>
-              <a:t>1/10/2020</a:t>
+              <a:t>2/4/2020</a:t>
             </a:fld>
             <a:endParaRPr lang="en-US"/>
           </a:p>
@@ -12177,7 +12177,7 @@
           <a:p>
             <a:fld id="{5958763E-B898-436D-883D-03711491D54A}" type="datetimeFigureOut">
               <a:rPr lang="en-US" smtClean="0"/>
-              <a:t>1/10/2020</a:t>
+              <a:t>2/4/2020</a:t>
             </a:fld>
             <a:endParaRPr lang="en-US"/>
           </a:p>
@@ -12308,7 +12308,7 @@
           <a:p>
             <a:fld id="{5958763E-B898-436D-883D-03711491D54A}" type="datetimeFigureOut">
               <a:rPr lang="en-US" smtClean="0"/>
-              <a:t>1/10/2020</a:t>
+              <a:t>2/4/2020</a:t>
             </a:fld>
             <a:endParaRPr lang="en-US"/>
           </a:p>
@@ -12439,7 +12439,7 @@
           <a:p>
             <a:fld id="{5958763E-B898-436D-883D-03711491D54A}" type="datetimeFigureOut">
               <a:rPr lang="en-US" smtClean="0"/>
-              <a:t>1/10/2020</a:t>
+              <a:t>2/4/2020</a:t>
             </a:fld>
             <a:endParaRPr lang="en-US"/>
           </a:p>
@@ -12570,7 +12570,7 @@
           <a:p>
             <a:fld id="{5958763E-B898-436D-883D-03711491D54A}" type="datetimeFigureOut">
               <a:rPr lang="en-US" smtClean="0"/>
-              <a:t>1/10/2020</a:t>
+              <a:t>2/4/2020</a:t>
             </a:fld>
             <a:endParaRPr lang="en-US"/>
           </a:p>
@@ -12701,7 +12701,7 @@
           <a:p>
             <a:fld id="{5958763E-B898-436D-883D-03711491D54A}" type="datetimeFigureOut">
               <a:rPr lang="en-US" smtClean="0"/>
-              <a:t>1/10/2020</a:t>
+              <a:t>2/4/2020</a:t>
             </a:fld>
             <a:endParaRPr lang="en-US"/>
           </a:p>
@@ -12832,7 +12832,7 @@
           <a:p>
             <a:fld id="{5958763E-B898-436D-883D-03711491D54A}" type="datetimeFigureOut">
               <a:rPr lang="en-US" smtClean="0"/>
-              <a:t>1/10/2020</a:t>
+              <a:t>2/4/2020</a:t>
             </a:fld>
             <a:endParaRPr lang="en-US"/>
           </a:p>
@@ -12963,7 +12963,7 @@
           <a:p>
             <a:fld id="{5958763E-B898-436D-883D-03711491D54A}" type="datetimeFigureOut">
               <a:rPr lang="en-US" smtClean="0"/>
-              <a:t>1/10/2020</a:t>
+              <a:t>2/4/2020</a:t>
             </a:fld>
             <a:endParaRPr lang="en-US"/>
           </a:p>
@@ -13103,7 +13103,7 @@
           <a:p>
             <a:fld id="{5958763E-B898-436D-883D-03711491D54A}" type="datetimeFigureOut">
               <a:rPr lang="en-US" smtClean="0"/>
-              <a:t>1/10/2020</a:t>
+              <a:t>2/4/2020</a:t>
             </a:fld>
             <a:endParaRPr lang="en-US"/>
           </a:p>
@@ -16464,7 +16464,7 @@
             <a:fld id="{1C2D31DE-C454-491C-B5C3-F097855E3DF7}" type="datetime4">
               <a:rPr lang="en-US" smtClean="0"/>
               <a:pPr/>
-              <a:t>January 10, 2020</a:t>
+              <a:t>February 4, 2020</a:t>
             </a:fld>
             <a:endParaRPr lang="en-US" dirty="0"/>
           </a:p>
@@ -28709,7 +28709,7 @@
           <a:p>
             <a:fld id="{5958763E-B898-436D-883D-03711491D54A}" type="datetimeFigureOut">
               <a:rPr lang="en-US" smtClean="0"/>
-              <a:t>1/10/2020</a:t>
+              <a:t>2/4/2020</a:t>
             </a:fld>
             <a:endParaRPr lang="en-US"/>
           </a:p>
@@ -29118,7 +29118,7 @@
           <a:p>
             <a:fld id="{5958763E-B898-436D-883D-03711491D54A}" type="datetimeFigureOut">
               <a:rPr lang="en-US" smtClean="0"/>
-              <a:t>1/10/2020</a:t>
+              <a:t>2/4/2020</a:t>
             </a:fld>
             <a:endParaRPr lang="en-US"/>
           </a:p>
@@ -29419,7 +29419,7 @@
           <a:p>
             <a:fld id="{5958763E-B898-436D-883D-03711491D54A}" type="datetimeFigureOut">
               <a:rPr lang="en-US" smtClean="0"/>
-              <a:t>1/10/2020</a:t>
+              <a:t>2/4/2020</a:t>
             </a:fld>
             <a:endParaRPr lang="en-US"/>
           </a:p>
@@ -29627,7 +29627,7 @@
           <a:p>
             <a:fld id="{5958763E-B898-436D-883D-03711491D54A}" type="datetimeFigureOut">
               <a:rPr lang="en-US" smtClean="0"/>
-              <a:t>1/10/2020</a:t>
+              <a:t>2/4/2020</a:t>
             </a:fld>
             <a:endParaRPr lang="en-US"/>
           </a:p>
@@ -29895,7 +29895,7 @@
           <a:p>
             <a:fld id="{5958763E-B898-436D-883D-03711491D54A}" type="datetimeFigureOut">
               <a:rPr lang="en-US" smtClean="0"/>
-              <a:t>1/10/2020</a:t>
+              <a:t>2/4/2020</a:t>
             </a:fld>
             <a:endParaRPr lang="en-US"/>
           </a:p>
@@ -30412,7 +30412,7 @@
           <a:p>
             <a:fld id="{5958763E-B898-436D-883D-03711491D54A}" type="datetimeFigureOut">
               <a:rPr lang="en-US" smtClean="0"/>
-              <a:t>1/10/2020</a:t>
+              <a:t>2/4/2020</a:t>
             </a:fld>
             <a:endParaRPr lang="en-US"/>
           </a:p>
@@ -30900,7 +30900,7 @@
           <a:p>
             <a:fld id="{5958763E-B898-436D-883D-03711491D54A}" type="datetimeFigureOut">
               <a:rPr lang="en-US" smtClean="0"/>
-              <a:t>1/10/2020</a:t>
+              <a:t>2/4/2020</a:t>
             </a:fld>
             <a:endParaRPr lang="en-US"/>
           </a:p>
@@ -31726,7 +31726,7 @@
           <a:p>
             <a:fld id="{5958763E-B898-436D-883D-03711491D54A}" type="datetimeFigureOut">
               <a:rPr lang="en-US" smtClean="0"/>
-              <a:t>1/10/2020</a:t>
+              <a:t>2/4/2020</a:t>
             </a:fld>
             <a:endParaRPr lang="en-US"/>
           </a:p>
@@ -31934,7 +31934,7 @@
           <a:p>
             <a:fld id="{5958763E-B898-436D-883D-03711491D54A}" type="datetimeFigureOut">
               <a:rPr lang="en-US" smtClean="0"/>
-              <a:t>1/10/2020</a:t>
+              <a:t>2/4/2020</a:t>
             </a:fld>
             <a:endParaRPr lang="en-US"/>
           </a:p>
@@ -32276,7 +32276,7 @@
           <a:p>
             <a:fld id="{5958763E-B898-436D-883D-03711491D54A}" type="datetimeFigureOut">
               <a:rPr lang="en-US" smtClean="0"/>
-              <a:t>1/10/2020</a:t>
+              <a:t>2/4/2020</a:t>
             </a:fld>
             <a:endParaRPr lang="en-US"/>
           </a:p>
@@ -32513,7 +32513,7 @@
           <a:p>
             <a:fld id="{5958763E-B898-436D-883D-03711491D54A}" type="datetimeFigureOut">
               <a:rPr lang="en-US" smtClean="0"/>
-              <a:t>1/10/2020</a:t>
+              <a:t>2/4/2020</a:t>
             </a:fld>
             <a:endParaRPr lang="en-US"/>
           </a:p>
@@ -32764,7 +32764,7 @@
           <a:p>
             <a:fld id="{5958763E-B898-436D-883D-03711491D54A}" type="datetimeFigureOut">
               <a:rPr lang="en-US" smtClean="0"/>
-              <a:t>1/10/2020</a:t>
+              <a:t>2/4/2020</a:t>
             </a:fld>
             <a:endParaRPr lang="en-US"/>
           </a:p>
@@ -39671,6 +39671,13 @@
   <p:transition>
     <p:fade/>
   </p:transition>
+  <p:timing>
+    <p:tnLst>
+      <p:par>
+        <p:cTn id="1" dur="indefinite" restart="never" nodeType="tmRoot"/>
+      </p:par>
+    </p:tnLst>
+  </p:timing>
 </p:sld>
 </file>
 

</xml_diff>